<commit_message>
Update Ryan's Recommenders slides
</commit_message>
<xml_diff>
--- a/recommendation-systems/ryan_henning/Recommenders.pptx
+++ b/recommendation-systems/ryan_henning/Recommenders.pptx
@@ -3769,7 +3769,7 @@
   <p:cSld>
     <p:spTree>
       <p:nvGrpSpPr>
-        <p:cNvPr id="330" name="Shape 330"/>
+        <p:cNvPr id="329" name="Shape 329"/>
         <p:cNvGrpSpPr/>
         <p:nvPr/>
       </p:nvGrpSpPr>
@@ -3783,7 +3783,7 @@
       </p:grpSpPr>
       <p:sp>
         <p:nvSpPr>
-          <p:cNvPr id="331" name="Shape 331"/>
+          <p:cNvPr id="330" name="Shape 330"/>
           <p:cNvSpPr/>
           <p:nvPr>
             <p:ph idx="2" type="sldImg"/>
@@ -3817,7 +3817,7 @@
       </p:sp>
       <p:sp>
         <p:nvSpPr>
-          <p:cNvPr id="332" name="Shape 332"/>
+          <p:cNvPr id="331" name="Shape 331"/>
           <p:cNvSpPr txBox="1"/>
           <p:nvPr>
             <p:ph idx="1" type="body"/>
@@ -5005,7 +5005,7 @@
             </a:pPr>
             <a:r>
               <a:rPr lang="en"/>
-              <a:t>\arg \min_{U,V, b^*, b'} \sum_{i,j \in \mathcal{K}} (r_{ij} - \mu - b^*_i - b'_j - u_{i:} \cdot v_{:j})^2 + \lambda (||u_{i:}||^2 + ||v_{:j}||^2 + (b^*_i)^2 + (b'_j)^2)</a:t>
+              <a:t>\arg \min_{U,V, b^*, b'} \sum_{i,j \in \mathcal{K}} (r_{ij} - \mu - b^*_i - b'_j - u_{i:} \cdot v_{:j})^2 + \lambda_1 (||u_{i:}||^2 + ||v_{:j}||^2) + \lambda_2 ( (b^*_i)^2 + (b'_j)^2)</a:t>
             </a:r>
           </a:p>
           <a:p>
@@ -20216,7 +20216,7 @@
         </p:nvSpPr>
         <p:spPr>
           <a:xfrm>
-            <a:off x="471900" y="3687350"/>
+            <a:off x="471900" y="3763550"/>
             <a:ext cx="4450500" cy="1268100"/>
           </a:xfrm>
           <a:prstGeom prst="rect">
@@ -20282,7 +20282,7 @@
             <a:r>
               <a:t/>
             </a:r>
-            <a:endParaRPr sz="1800">
+            <a:endParaRPr sz="1200">
               <a:solidFill>
                 <a:srgbClr val="CC4125"/>
               </a:solidFill>
@@ -21292,7 +21292,7 @@
             </a:pPr>
             <a:r>
               <a:rPr lang="en"/>
-              <a:t>ALS vs SGD</a:t>
+              <a:t>UVD via Stochastic Gradient Descent (SGD)</a:t>
             </a:r>
           </a:p>
         </p:txBody>
@@ -21308,7 +21308,7 @@
         <p:spPr>
           <a:xfrm>
             <a:off x="471900" y="1919075"/>
-            <a:ext cx="3999900" cy="2710199"/>
+            <a:ext cx="8222100" cy="2710200"/>
           </a:xfrm>
           <a:prstGeom prst="rect">
             <a:avLst/>
@@ -21320,70 +21320,189 @@
           </a:bodyPr>
           <a:lstStyle/>
           <a:p>
-            <a:pPr lvl="0" rtl="0">
-              <a:spcBef>
-                <a:spcPts val="0"/>
-              </a:spcBef>
-              <a:buNone/>
-            </a:pPr>
-            <a:r>
-              <a:rPr b="1" lang="en" sz="1800"/>
-              <a:t>ALS:</a:t>
-            </a:r>
-          </a:p>
-          <a:p>
-            <a:pPr indent="-342900" lvl="0" marL="457200" rtl="0">
-              <a:spcBef>
-                <a:spcPts val="0"/>
-              </a:spcBef>
-              <a:buSzPct val="100000"/>
-            </a:pPr>
-            <a:r>
-              <a:rPr lang="en" sz="1800"/>
-              <a:t>Parallelizes very well</a:t>
-            </a:r>
-          </a:p>
-          <a:p>
-            <a:pPr indent="-342900" lvl="0" marL="457200" rtl="0">
-              <a:spcBef>
-                <a:spcPts val="0"/>
-              </a:spcBef>
-              <a:buSzPct val="100000"/>
-            </a:pPr>
-            <a:r>
-              <a:rPr lang="en" sz="1800"/>
-              <a:t>No learning rate required</a:t>
-            </a:r>
-          </a:p>
-          <a:p>
-            <a:pPr indent="-342900" lvl="0" marL="457200" rtl="0">
-              <a:spcBef>
-                <a:spcPts val="0"/>
-              </a:spcBef>
-              <a:buSzPct val="100000"/>
-            </a:pPr>
-            <a:r>
-              <a:rPr lang="en" sz="1800"/>
-              <a:t>Available in Spark/MLib</a:t>
-            </a:r>
-          </a:p>
-          <a:p>
-            <a:pPr indent="-342900" lvl="0" marL="457200" rtl="0">
-              <a:spcBef>
-                <a:spcPts val="0"/>
-              </a:spcBef>
-              <a:buSzPct val="100000"/>
-            </a:pPr>
-            <a:r>
-              <a:rPr lang="en" sz="1800"/>
-              <a:t>Works well on dense matrices</a:t>
+            <a:pPr lvl="0">
+              <a:spcBef>
+                <a:spcPts val="0"/>
+              </a:spcBef>
+              <a:buNone/>
+            </a:pPr>
+            <a:r>
+              <a:rPr b="1" lang="en">
+                <a:solidFill>
+                  <a:srgbClr val="CC4125"/>
+                </a:solidFill>
+              </a:rPr>
+              <a:t>Boardwork… (take notes!)</a:t>
+            </a:r>
+          </a:p>
+        </p:txBody>
+      </p:sp>
+    </p:spTree>
+  </p:cSld>
+  <p:clrMapOvr>
+    <a:masterClrMapping/>
+  </p:clrMapOvr>
+  <p:transition spd="slow">
+    <p:cut/>
+  </p:transition>
+</p:sld>
+</file>
+
+<file path=ppt/slides/slide32.xml><?xml version="1.0" encoding="utf-8"?>
+<p:sld xmlns:a="http://schemas.openxmlformats.org/drawingml/2006/main" xmlns:r="http://schemas.openxmlformats.org/officeDocument/2006/relationships" xmlns:mc="http://schemas.openxmlformats.org/markup-compatibility/2006" xmlns:mv="urn:schemas-microsoft-com:mac:vml" xmlns:p="http://schemas.openxmlformats.org/presentationml/2006/main" xmlns:c="http://schemas.openxmlformats.org/drawingml/2006/chart" xmlns:dgm="http://schemas.openxmlformats.org/drawingml/2006/diagram" xmlns:o="urn:schemas-microsoft-com:office:office" xmlns:v="urn:schemas-microsoft-com:vml" xmlns:pvml="urn:schemas-microsoft-com:office:powerpoint" xmlns:com="http://schemas.openxmlformats.org/drawingml/2006/compatibility" xmlns:p14="http://schemas.microsoft.com/office/powerpoint/2010/main">
+  <p:cSld>
+    <p:spTree>
+      <p:nvGrpSpPr>
+        <p:cNvPr id="332" name="Shape 332"/>
+        <p:cNvGrpSpPr/>
+        <p:nvPr/>
+      </p:nvGrpSpPr>
+      <p:grpSpPr>
+        <a:xfrm>
+          <a:off x="0" y="0"/>
+          <a:ext cx="0" cy="0"/>
+          <a:chOff x="0" y="0"/>
+          <a:chExt cx="0" cy="0"/>
+        </a:xfrm>
+      </p:grpSpPr>
+      <p:sp>
+        <p:nvSpPr>
+          <p:cNvPr id="333" name="Shape 333"/>
+          <p:cNvSpPr txBox="1"/>
+          <p:nvPr>
+            <p:ph type="title"/>
+          </p:nvPr>
+        </p:nvSpPr>
+        <p:spPr>
+          <a:xfrm>
+            <a:off x="471900" y="738725"/>
+            <a:ext cx="8222100" cy="767700"/>
+          </a:xfrm>
+          <a:prstGeom prst="rect">
+            <a:avLst/>
+          </a:prstGeom>
+        </p:spPr>
+        <p:txBody>
+          <a:bodyPr anchorCtr="0" anchor="b" bIns="91425" lIns="91425" rIns="91425" tIns="91425">
+            <a:noAutofit/>
+          </a:bodyPr>
+          <a:lstStyle/>
+          <a:p>
+            <a:pPr lvl="0">
+              <a:spcBef>
+                <a:spcPts val="0"/>
+              </a:spcBef>
+              <a:buNone/>
+            </a:pPr>
+            <a:r>
+              <a:rPr lang="en"/>
+              <a:t>ALS vs SGD</a:t>
             </a:r>
           </a:p>
         </p:txBody>
       </p:sp>
       <p:sp>
         <p:nvSpPr>
-          <p:cNvPr id="329" name="Shape 329"/>
+          <p:cNvPr id="334" name="Shape 334"/>
+          <p:cNvSpPr txBox="1"/>
+          <p:nvPr>
+            <p:ph idx="1" type="body"/>
+          </p:nvPr>
+        </p:nvSpPr>
+        <p:spPr>
+          <a:xfrm>
+            <a:off x="471900" y="1919075"/>
+            <a:ext cx="4222200" cy="3048300"/>
+          </a:xfrm>
+          <a:prstGeom prst="rect">
+            <a:avLst/>
+          </a:prstGeom>
+        </p:spPr>
+        <p:txBody>
+          <a:bodyPr anchorCtr="0" anchor="t" bIns="91425" lIns="91425" rIns="91425" tIns="91425">
+            <a:noAutofit/>
+          </a:bodyPr>
+          <a:lstStyle/>
+          <a:p>
+            <a:pPr lvl="0" rtl="0">
+              <a:spcBef>
+                <a:spcPts val="0"/>
+              </a:spcBef>
+              <a:buNone/>
+            </a:pPr>
+            <a:r>
+              <a:rPr b="1" lang="en" sz="1800"/>
+              <a:t>ALS:</a:t>
+            </a:r>
+          </a:p>
+          <a:p>
+            <a:pPr indent="-342900" lvl="0" marL="457200" rtl="0">
+              <a:spcBef>
+                <a:spcPts val="0"/>
+              </a:spcBef>
+              <a:buSzPct val="100000"/>
+            </a:pPr>
+            <a:r>
+              <a:rPr lang="en" sz="1800"/>
+              <a:t>Parallelizes very well</a:t>
+            </a:r>
+          </a:p>
+          <a:p>
+            <a:pPr indent="-342900" lvl="0" marL="457200" rtl="0">
+              <a:spcBef>
+                <a:spcPts val="0"/>
+              </a:spcBef>
+              <a:buSzPct val="100000"/>
+            </a:pPr>
+            <a:r>
+              <a:rPr lang="en" sz="1800"/>
+              <a:t>No learning rate required</a:t>
+            </a:r>
+          </a:p>
+          <a:p>
+            <a:pPr indent="-342900" lvl="0" marL="457200" rtl="0">
+              <a:spcBef>
+                <a:spcPts val="0"/>
+              </a:spcBef>
+              <a:buSzPct val="100000"/>
+            </a:pPr>
+            <a:r>
+              <a:rPr lang="en" sz="1800"/>
+              <a:t>Available in Spark/MLlib</a:t>
+            </a:r>
+          </a:p>
+          <a:p>
+            <a:pPr indent="-342900" lvl="0" marL="457200" rtl="0">
+              <a:spcBef>
+                <a:spcPts val="0"/>
+              </a:spcBef>
+              <a:buSzPct val="100000"/>
+            </a:pPr>
+            <a:r>
+              <a:rPr lang="en" sz="1800"/>
+              <a:t>Only appropriate for matrices that don’t have missing values</a:t>
+            </a:r>
+            <a:br>
+              <a:rPr lang="en" sz="1800"/>
+            </a:br>
+            <a:r>
+              <a:rPr lang="en"/>
+              <a:t>(we’ll call this a </a:t>
+            </a:r>
+            <a:r>
+              <a:rPr b="1" lang="en"/>
+              <a:t>dense</a:t>
+            </a:r>
+            <a:r>
+              <a:rPr lang="en"/>
+              <a:t> matrix in this lecture)</a:t>
+            </a:r>
+          </a:p>
+        </p:txBody>
+      </p:sp>
+      <p:sp>
+        <p:nvSpPr>
+          <p:cNvPr id="335" name="Shape 335"/>
           <p:cNvSpPr txBox="1"/>
           <p:nvPr>
             <p:ph idx="2" type="body"/>
@@ -21391,8 +21510,8 @@
         </p:nvSpPr>
         <p:spPr>
           <a:xfrm>
-            <a:off x="4694250" y="1919074"/>
-            <a:ext cx="3999900" cy="3048300"/>
+            <a:off x="4770450" y="1919075"/>
+            <a:ext cx="4222200" cy="3048300"/>
           </a:xfrm>
           <a:prstGeom prst="rect">
             <a:avLst/>
@@ -21466,8 +21585,23 @@
               <a:rPr lang="en" sz="1800"/>
             </a:br>
             <a:r>
-              <a:rPr lang="en" sz="1600"/>
-              <a:t>(more on this later)</a:t>
+              <a:rPr lang="en"/>
+              <a:t>(we’ll call this a </a:t>
+            </a:r>
+            <a:r>
+              <a:rPr b="1" lang="en"/>
+              <a:t>sparse</a:t>
+            </a:r>
+            <a:r>
+              <a:rPr lang="en"/>
+              <a:t> matrix in this lecture)</a:t>
+            </a:r>
+            <a:br>
+              <a:rPr lang="en"/>
+            </a:br>
+            <a:r>
+              <a:rPr lang="en"/>
+              <a:t>(we’ll see how missing values are handled soon!)</a:t>
             </a:r>
           </a:p>
         </p:txBody>
@@ -21514,7 +21648,7 @@
                                           </p:stCondLst>
                                         </p:cTn>
                                         <p:tgtEl>
-                                          <p:spTgt spid="328"/>
+                                          <p:spTgt spid="334"/>
                                         </p:tgtEl>
                                         <p:attrNameLst>
                                           <p:attrName>style.visibility</p:attrName>
@@ -21528,7 +21662,7 @@
                                       <p:cBhvr>
                                         <p:cTn dur="1000"/>
                                         <p:tgtEl>
-                                          <p:spTgt spid="328"/>
+                                          <p:spTgt spid="334"/>
                                         </p:tgtEl>
                                       </p:cBhvr>
                                     </p:animEffect>
@@ -21567,7 +21701,7 @@
                                           </p:stCondLst>
                                         </p:cTn>
                                         <p:tgtEl>
-                                          <p:spTgt spid="329"/>
+                                          <p:spTgt spid="335"/>
                                         </p:tgtEl>
                                         <p:attrNameLst>
                                           <p:attrName>style.visibility</p:attrName>
@@ -21581,7 +21715,7 @@
                                       <p:cBhvr>
                                         <p:cTn dur="1000"/>
                                         <p:tgtEl>
-                                          <p:spTgt spid="329"/>
+                                          <p:spTgt spid="335"/>
                                         </p:tgtEl>
                                       </p:cBhvr>
                                     </p:animEffect>
@@ -21616,110 +21750,6 @@
       </p:par>
     </p:tnLst>
   </p:timing>
-</p:sld>
-</file>
-
-<file path=ppt/slides/slide32.xml><?xml version="1.0" encoding="utf-8"?>
-<p:sld xmlns:a="http://schemas.openxmlformats.org/drawingml/2006/main" xmlns:r="http://schemas.openxmlformats.org/officeDocument/2006/relationships" xmlns:mc="http://schemas.openxmlformats.org/markup-compatibility/2006" xmlns:mv="urn:schemas-microsoft-com:mac:vml" xmlns:p="http://schemas.openxmlformats.org/presentationml/2006/main" xmlns:c="http://schemas.openxmlformats.org/drawingml/2006/chart" xmlns:dgm="http://schemas.openxmlformats.org/drawingml/2006/diagram" xmlns:o="urn:schemas-microsoft-com:office:office" xmlns:v="urn:schemas-microsoft-com:vml" xmlns:pvml="urn:schemas-microsoft-com:office:powerpoint" xmlns:com="http://schemas.openxmlformats.org/drawingml/2006/compatibility" xmlns:p14="http://schemas.microsoft.com/office/powerpoint/2010/main">
-  <p:cSld>
-    <p:spTree>
-      <p:nvGrpSpPr>
-        <p:cNvPr id="333" name="Shape 333"/>
-        <p:cNvGrpSpPr/>
-        <p:nvPr/>
-      </p:nvGrpSpPr>
-      <p:grpSpPr>
-        <a:xfrm>
-          <a:off x="0" y="0"/>
-          <a:ext cx="0" cy="0"/>
-          <a:chOff x="0" y="0"/>
-          <a:chExt cx="0" cy="0"/>
-        </a:xfrm>
-      </p:grpSpPr>
-      <p:sp>
-        <p:nvSpPr>
-          <p:cNvPr id="334" name="Shape 334"/>
-          <p:cNvSpPr txBox="1"/>
-          <p:nvPr>
-            <p:ph type="title"/>
-          </p:nvPr>
-        </p:nvSpPr>
-        <p:spPr>
-          <a:xfrm>
-            <a:off x="471900" y="738725"/>
-            <a:ext cx="8222100" cy="767700"/>
-          </a:xfrm>
-          <a:prstGeom prst="rect">
-            <a:avLst/>
-          </a:prstGeom>
-        </p:spPr>
-        <p:txBody>
-          <a:bodyPr anchorCtr="0" anchor="b" bIns="91425" lIns="91425" rIns="91425" tIns="91425">
-            <a:noAutofit/>
-          </a:bodyPr>
-          <a:lstStyle/>
-          <a:p>
-            <a:pPr lvl="0">
-              <a:spcBef>
-                <a:spcPts val="0"/>
-              </a:spcBef>
-              <a:buNone/>
-            </a:pPr>
-            <a:r>
-              <a:rPr lang="en"/>
-              <a:t>UVD via Stochastic Gradient Descent (SGD)</a:t>
-            </a:r>
-          </a:p>
-        </p:txBody>
-      </p:sp>
-      <p:sp>
-        <p:nvSpPr>
-          <p:cNvPr id="335" name="Shape 335"/>
-          <p:cNvSpPr txBox="1"/>
-          <p:nvPr>
-            <p:ph idx="1" type="body"/>
-          </p:nvPr>
-        </p:nvSpPr>
-        <p:spPr>
-          <a:xfrm>
-            <a:off x="471900" y="1919075"/>
-            <a:ext cx="8222100" cy="2710200"/>
-          </a:xfrm>
-          <a:prstGeom prst="rect">
-            <a:avLst/>
-          </a:prstGeom>
-        </p:spPr>
-        <p:txBody>
-          <a:bodyPr anchorCtr="0" anchor="t" bIns="91425" lIns="91425" rIns="91425" tIns="91425">
-            <a:noAutofit/>
-          </a:bodyPr>
-          <a:lstStyle/>
-          <a:p>
-            <a:pPr lvl="0">
-              <a:spcBef>
-                <a:spcPts val="0"/>
-              </a:spcBef>
-              <a:buNone/>
-            </a:pPr>
-            <a:r>
-              <a:rPr b="1" lang="en">
-                <a:solidFill>
-                  <a:srgbClr val="CC4125"/>
-                </a:solidFill>
-              </a:rPr>
-              <a:t>Boardwork… (take notes!)</a:t>
-            </a:r>
-          </a:p>
-        </p:txBody>
-      </p:sp>
-    </p:spTree>
-  </p:cSld>
-  <p:clrMapOvr>
-    <a:masterClrMapping/>
-  </p:clrMapOvr>
-  <p:transition spd="slow">
-    <p:cut/>
-  </p:transition>
 </p:sld>
 </file>
 
@@ -27089,81 +27119,9 @@
           <a:chExt cx="0" cy="0"/>
         </a:xfrm>
       </p:grpSpPr>
-      <p:sp>
-        <p:nvSpPr>
-          <p:cNvPr id="410" name="Shape 410"/>
-          <p:cNvSpPr txBox="1"/>
-          <p:nvPr>
-            <p:ph type="title"/>
-          </p:nvPr>
-        </p:nvSpPr>
-        <p:spPr>
-          <a:xfrm>
-            <a:off x="98250" y="16350"/>
-            <a:ext cx="8826600" cy="602700"/>
-          </a:xfrm>
-          <a:prstGeom prst="rect">
-            <a:avLst/>
-          </a:prstGeom>
-        </p:spPr>
-        <p:txBody>
-          <a:bodyPr anchorCtr="0" anchor="ctr" bIns="91425" lIns="91425" rIns="91425" tIns="91425">
-            <a:noAutofit/>
-          </a:bodyPr>
-          <a:lstStyle/>
-          <a:p>
-            <a:pPr lvl="0" rtl="0">
-              <a:spcBef>
-                <a:spcPts val="0"/>
-              </a:spcBef>
-              <a:buNone/>
-            </a:pPr>
-            <a:r>
-              <a:rPr lang="en"/>
-              <a:t>Accounting for Biases (the new cost function)</a:t>
-            </a:r>
-          </a:p>
-        </p:txBody>
-      </p:sp>
-      <p:sp>
-        <p:nvSpPr>
-          <p:cNvPr id="411" name="Shape 411"/>
-          <p:cNvSpPr txBox="1"/>
-          <p:nvPr>
-            <p:ph idx="4294967295" type="body"/>
-          </p:nvPr>
-        </p:nvSpPr>
-        <p:spPr>
-          <a:xfrm>
-            <a:off x="471900" y="869000"/>
-            <a:ext cx="8222100" cy="704700"/>
-          </a:xfrm>
-          <a:prstGeom prst="rect">
-            <a:avLst/>
-          </a:prstGeom>
-        </p:spPr>
-        <p:txBody>
-          <a:bodyPr anchorCtr="0" anchor="t" bIns="91425" lIns="91425" rIns="91425" tIns="91425">
-            <a:noAutofit/>
-          </a:bodyPr>
-          <a:lstStyle/>
-          <a:p>
-            <a:pPr lvl="0" rtl="0">
-              <a:spcBef>
-                <a:spcPts val="0"/>
-              </a:spcBef>
-              <a:buNone/>
-            </a:pPr>
-            <a:r>
-              <a:rPr lang="en"/>
-              <a:t>Ratings are now estimated as:</a:t>
-            </a:r>
-          </a:p>
-        </p:txBody>
-      </p:sp>
       <p:pic>
         <p:nvPicPr>
-          <p:cNvPr id="412" name="Shape 412"/>
+          <p:cNvPr id="410" name="Shape 410"/>
           <p:cNvPicPr preferRelativeResize="0"/>
           <p:nvPr/>
         </p:nvPicPr>
@@ -27177,8 +27135,8 @@
         </p:blipFill>
         <p:spPr>
           <a:xfrm>
-            <a:off x="765750" y="3462764"/>
-            <a:ext cx="8222100" cy="531010"/>
+            <a:off x="765725" y="3429649"/>
+            <a:ext cx="8222100" cy="505325"/>
           </a:xfrm>
           <a:prstGeom prst="rect">
             <a:avLst/>
@@ -27189,6 +27147,78 @@
           </a:ln>
         </p:spPr>
       </p:pic>
+      <p:sp>
+        <p:nvSpPr>
+          <p:cNvPr id="411" name="Shape 411"/>
+          <p:cNvSpPr txBox="1"/>
+          <p:nvPr>
+            <p:ph type="title"/>
+          </p:nvPr>
+        </p:nvSpPr>
+        <p:spPr>
+          <a:xfrm>
+            <a:off x="98250" y="16350"/>
+            <a:ext cx="8826600" cy="602700"/>
+          </a:xfrm>
+          <a:prstGeom prst="rect">
+            <a:avLst/>
+          </a:prstGeom>
+        </p:spPr>
+        <p:txBody>
+          <a:bodyPr anchorCtr="0" anchor="ctr" bIns="91425" lIns="91425" rIns="91425" tIns="91425">
+            <a:noAutofit/>
+          </a:bodyPr>
+          <a:lstStyle/>
+          <a:p>
+            <a:pPr lvl="0" rtl="0">
+              <a:spcBef>
+                <a:spcPts val="0"/>
+              </a:spcBef>
+              <a:buNone/>
+            </a:pPr>
+            <a:r>
+              <a:rPr lang="en"/>
+              <a:t>Accounting for Biases (the new cost function)</a:t>
+            </a:r>
+          </a:p>
+        </p:txBody>
+      </p:sp>
+      <p:sp>
+        <p:nvSpPr>
+          <p:cNvPr id="412" name="Shape 412"/>
+          <p:cNvSpPr txBox="1"/>
+          <p:nvPr>
+            <p:ph idx="4294967295" type="body"/>
+          </p:nvPr>
+        </p:nvSpPr>
+        <p:spPr>
+          <a:xfrm>
+            <a:off x="471900" y="869000"/>
+            <a:ext cx="8222100" cy="704700"/>
+          </a:xfrm>
+          <a:prstGeom prst="rect">
+            <a:avLst/>
+          </a:prstGeom>
+        </p:spPr>
+        <p:txBody>
+          <a:bodyPr anchorCtr="0" anchor="t" bIns="91425" lIns="91425" rIns="91425" tIns="91425">
+            <a:noAutofit/>
+          </a:bodyPr>
+          <a:lstStyle/>
+          <a:p>
+            <a:pPr lvl="0" rtl="0">
+              <a:spcBef>
+                <a:spcPts val="0"/>
+              </a:spcBef>
+              <a:buNone/>
+            </a:pPr>
+            <a:r>
+              <a:rPr lang="en"/>
+              <a:t>Ratings are now estimated as:</a:t>
+            </a:r>
+          </a:p>
+        </p:txBody>
+      </p:sp>
       <p:sp>
         <p:nvSpPr>
           <p:cNvPr id="413" name="Shape 413"/>
@@ -27261,8 +27291,8 @@
         </p:nvSpPr>
         <p:spPr>
           <a:xfrm>
-            <a:off x="2750325" y="3321024"/>
-            <a:ext cx="1471200" cy="602700"/>
+            <a:off x="2609776" y="3285473"/>
+            <a:ext cx="1412400" cy="602700"/>
           </a:xfrm>
           <a:prstGeom prst="ellipse">
             <a:avLst/>
@@ -27350,8 +27380,8 @@
         </p:nvCxnSpPr>
         <p:spPr>
           <a:xfrm rot="10800000">
-            <a:off x="3486000" y="3923825"/>
-            <a:ext cx="524400" cy="603900"/>
+            <a:off x="3315900" y="3888125"/>
+            <a:ext cx="694500" cy="639600"/>
           </a:xfrm>
           <a:prstGeom prst="straightConnector1">
             <a:avLst/>
@@ -27376,8 +27406,8 @@
         </p:nvSpPr>
         <p:spPr>
           <a:xfrm>
-            <a:off x="7458575" y="3272874"/>
-            <a:ext cx="1501200" cy="716700"/>
+            <a:off x="7181949" y="3199875"/>
+            <a:ext cx="1902600" cy="777900"/>
           </a:xfrm>
           <a:prstGeom prst="ellipse">
             <a:avLst/>
@@ -27465,8 +27495,8 @@
         </p:nvCxnSpPr>
         <p:spPr>
           <a:xfrm flipH="1" rot="10800000">
-            <a:off x="7973750" y="3989700"/>
-            <a:ext cx="235500" cy="622800"/>
+            <a:off x="7973750" y="3977700"/>
+            <a:ext cx="159600" cy="634800"/>
           </a:xfrm>
           <a:prstGeom prst="straightConnector1">
             <a:avLst/>
@@ -27593,59 +27623,6 @@
                                         <p:cTn dur="1000"/>
                                         <p:tgtEl>
                                           <p:spTgt spid="413"/>
-                                        </p:tgtEl>
-                                      </p:cBhvr>
-                                    </p:animEffect>
-                                  </p:childTnLst>
-                                </p:cTn>
-                              </p:par>
-                            </p:childTnLst>
-                          </p:cTn>
-                        </p:par>
-                      </p:childTnLst>
-                    </p:cTn>
-                  </p:par>
-                  <p:par>
-                    <p:cTn fill="hold">
-                      <p:stCondLst>
-                        <p:cond delay="indefinite"/>
-                      </p:stCondLst>
-                      <p:childTnLst>
-                        <p:par>
-                          <p:cTn fill="hold">
-                            <p:stCondLst>
-                              <p:cond delay="0"/>
-                            </p:stCondLst>
-                            <p:childTnLst>
-                              <p:par>
-                                <p:cTn fill="hold" nodeType="clickEffect" presetClass="entr" presetID="10" presetSubtype="0">
-                                  <p:stCondLst>
-                                    <p:cond delay="0"/>
-                                  </p:stCondLst>
-                                  <p:childTnLst>
-                                    <p:set>
-                                      <p:cBhvr>
-                                        <p:cTn dur="1" fill="hold">
-                                          <p:stCondLst>
-                                            <p:cond delay="0"/>
-                                          </p:stCondLst>
-                                        </p:cTn>
-                                        <p:tgtEl>
-                                          <p:spTgt spid="412"/>
-                                        </p:tgtEl>
-                                        <p:attrNameLst>
-                                          <p:attrName>style.visibility</p:attrName>
-                                        </p:attrNameLst>
-                                      </p:cBhvr>
-                                      <p:to>
-                                        <p:strVal val="visible"/>
-                                      </p:to>
-                                    </p:set>
-                                    <p:animEffect filter="fade" transition="in">
-                                      <p:cBhvr>
-                                        <p:cTn dur="1000"/>
-                                        <p:tgtEl>
-                                          <p:spTgt spid="412"/>
                                         </p:tgtEl>
                                       </p:cBhvr>
                                     </p:animEffect>
@@ -28120,12 +28097,20 @@
               <a:buNone/>
             </a:pPr>
             <a:r>
+              <a:rPr b="1" lang="en">
+                <a:solidFill>
+                  <a:srgbClr val="434343"/>
+                </a:solidFill>
+              </a:rPr>
+              <a:t>Netflix’s inhouse model performs at RMSE=0.9514 on this dataset</a:t>
+            </a:r>
+            <a:r>
               <a:rPr lang="en">
                 <a:solidFill>
                   <a:srgbClr val="434343"/>
                 </a:solidFill>
               </a:rPr>
-              <a:t>Netflix’s inhouse model performs at RMSE=0.9514 on this dataset, so even the simple matrix factorization models are beating it!</a:t>
+              <a:t>, so even the simple matrix factorization models are beating it!</a:t>
             </a:r>
           </a:p>
           <a:p>

</xml_diff>

<commit_message>
Add Ryan's updated recommender slides
</commit_message>
<xml_diff>
--- a/recommendation-systems/ryan_henning/Recommenders.pptx
+++ b/recommendation-systems/ryan_henning/Recommenders.pptx
@@ -2559,7 +2559,7 @@
             </a:pPr>
             <a:r>
               <a:rPr lang="en"/>
-              <a:t>This might capture more of how the recommender will perform in the wild, espeically if the items have temporal behavior (as “new releases” on nextflix probably do, but probably not items for sale on Amazon). The idea is that since we’re making future predictions, we’ll make the holdout set the future. This still has one of the same problems as the previous slide: in the wild, we only care that the top recommendations are good, but we still can’t actually measure that. E.g. Say our model recommends 10 movies… we look in the holdout set (from the future), and the user still hasn’t rated those movies. We CAN’T evaluate those recommendations as either good OR bad.</a:t>
+              <a:t>This might capture more of how the recommender will perform in the wild, especially if the items have temporal behavior (as “new releases” on netflix probably do, but probably not items for sale on Amazon). The idea is that since we’re making future predictions, we’ll make the holdout set the future. This still has one of the same problems as the previous slide: in the wild, we only care that the top recommendations are good, but we still can’t actually measure that. E.g. Say our model recommends 10 movies… we look in the holdout set (from the future), and the user still hasn’t rated those movies. We CAN’T evaluate those recommendations as either good OR bad.</a:t>
             </a:r>
           </a:p>
         </p:txBody>
@@ -5673,7 +5673,7 @@
             </a:pPr>
             <a:r>
               <a:rPr lang="en"/>
-              <a:t>Amazon purchases, Facebook likes, Twitter hashtags, ...</a:t>
+              <a:t>Amazon purchases, Facebook likes, Twitter hashtags, Youtube views, Article views ...</a:t>
             </a:r>
           </a:p>
         </p:txBody>
@@ -10093,13 +10093,13 @@
               <a:buNone/>
             </a:pPr>
             <a:r>
-              <a:rPr lang="en" sz="2400">
-                <a:solidFill>
-                  <a:srgbClr val="CC4125"/>
-                </a:solidFill>
-              </a:rPr>
-              <a:t>Warning: this will be a very interactive lecture!</a:t>
-            </a:r>
+              <a:t/>
+            </a:r>
+            <a:endParaRPr sz="2400">
+              <a:solidFill>
+                <a:srgbClr val="CC4125"/>
+              </a:solidFill>
+            </a:endParaRPr>
           </a:p>
         </p:txBody>
       </p:sp>
@@ -10355,9 +10355,6 @@
   <p:clrMapOvr>
     <a:masterClrMapping/>
   </p:clrMapOvr>
-  <p:transition spd="slow">
-    <p:cut/>
-  </p:transition>
 </p:sld>
 </file>
 
@@ -10621,9 +10618,6 @@
   <p:clrMapOvr>
     <a:masterClrMapping/>
   </p:clrMapOvr>
-  <p:transition spd="slow">
-    <p:cut/>
-  </p:transition>
 </p:sld>
 </file>
 
@@ -11157,9 +11151,6 @@
   <p:clrMapOvr>
     <a:masterClrMapping/>
   </p:clrMapOvr>
-  <p:transition spd="slow">
-    <p:cut/>
-  </p:transition>
   <p:timing>
     <p:tnLst>
       <p:par>
@@ -11846,9 +11837,6 @@
   <p:clrMapOvr>
     <a:masterClrMapping/>
   </p:clrMapOvr>
-  <p:transition spd="slow">
-    <p:cut/>
-  </p:transition>
   <p:timing>
     <p:tnLst>
       <p:par>
@@ -12553,9 +12541,6 @@
   <p:clrMapOvr>
     <a:masterClrMapping/>
   </p:clrMapOvr>
-  <p:transition spd="slow">
-    <p:cut/>
-  </p:transition>
   <p:timing>
     <p:tnLst>
       <p:par>
@@ -13260,9 +13245,6 @@
   <p:clrMapOvr>
     <a:masterClrMapping/>
   </p:clrMapOvr>
-  <p:transition spd="slow">
-    <p:cut/>
-  </p:transition>
   <p:timing>
     <p:tnLst>
       <p:par>
@@ -13855,9 +13837,6 @@
   <p:clrMapOvr>
     <a:masterClrMapping/>
   </p:clrMapOvr>
-  <p:transition spd="slow">
-    <p:cut/>
-  </p:transition>
   <p:timing>
     <p:tnLst>
       <p:par>
@@ -14154,9 +14133,6 @@
   <p:clrMapOvr>
     <a:masterClrMapping/>
   </p:clrMapOvr>
-  <p:transition spd="slow">
-    <p:cut/>
-  </p:transition>
   <p:timing>
     <p:tnLst>
       <p:par>
@@ -14489,9 +14465,6 @@
   <p:clrMapOvr>
     <a:masterClrMapping/>
   </p:clrMapOvr>
-  <p:transition spd="slow">
-    <p:cut/>
-  </p:transition>
   <p:timing>
     <p:tnLst>
       <p:par>
@@ -15004,9 +14977,6 @@
   <p:clrMapOvr>
     <a:masterClrMapping/>
   </p:clrMapOvr>
-  <p:transition spd="slow">
-    <p:cut/>
-  </p:transition>
 </p:sld>
 </file>
 
@@ -15173,9 +15143,6 @@
   <p:clrMapOvr>
     <a:masterClrMapping/>
   </p:clrMapOvr>
-  <p:transition spd="slow">
-    <p:cut/>
-  </p:transition>
 </p:sld>
 </file>
 
@@ -15377,9 +15344,6 @@
   <p:clrMapOvr>
     <a:masterClrMapping/>
   </p:clrMapOvr>
-  <p:transition spd="slow">
-    <p:cut/>
-  </p:transition>
   <p:timing>
     <p:tnLst>
       <p:par>
@@ -15820,9 +15784,6 @@
   <p:clrMapOvr>
     <a:masterClrMapping/>
   </p:clrMapOvr>
-  <p:transition spd="slow">
-    <p:cut/>
-  </p:transition>
   <p:timing>
     <p:tnLst>
       <p:par>
@@ -16404,9 +16365,6 @@
   <p:clrMapOvr>
     <a:masterClrMapping/>
   </p:clrMapOvr>
-  <p:transition spd="slow">
-    <p:cut/>
-  </p:transition>
   <p:timing>
     <p:tnLst>
       <p:par>
@@ -17271,9 +17229,6 @@
   <p:clrMapOvr>
     <a:masterClrMapping/>
   </p:clrMapOvr>
-  <p:transition spd="slow">
-    <p:cut/>
-  </p:transition>
   <p:timing>
     <p:tnLst>
       <p:par>
@@ -17576,9 +17531,6 @@
   <p:clrMapOvr>
     <a:masterClrMapping/>
   </p:clrMapOvr>
-  <p:transition spd="slow">
-    <p:cut/>
-  </p:transition>
 </p:sld>
 </file>
 
@@ -17800,9 +17752,6 @@
   <p:clrMapOvr>
     <a:masterClrMapping/>
   </p:clrMapOvr>
-  <p:transition spd="slow">
-    <p:cut/>
-  </p:transition>
   <p:timing>
     <p:tnLst>
       <p:par>
@@ -18294,9 +18243,6 @@
   <p:clrMapOvr>
     <a:masterClrMapping/>
   </p:clrMapOvr>
-  <p:transition spd="slow">
-    <p:cut/>
-  </p:transition>
   <p:timing>
     <p:tnLst>
       <p:par>
@@ -18818,9 +18764,6 @@
   <p:clrMapOvr>
     <a:masterClrMapping/>
   </p:clrMapOvr>
-  <p:transition spd="slow">
-    <p:cut/>
-  </p:transition>
 </p:sld>
 </file>
 
@@ -19158,9 +19101,6 @@
   <p:clrMapOvr>
     <a:masterClrMapping/>
   </p:clrMapOvr>
-  <p:transition spd="slow">
-    <p:cut/>
-  </p:transition>
   <p:timing>
     <p:tnLst>
       <p:par>
@@ -19851,9 +19791,6 @@
   <p:clrMapOvr>
     <a:masterClrMapping/>
   </p:clrMapOvr>
-  <p:transition spd="slow">
-    <p:cut/>
-  </p:transition>
   <p:timing>
     <p:tnLst>
       <p:par>
@@ -20311,9 +20248,6 @@
   <p:clrMapOvr>
     <a:masterClrMapping/>
   </p:clrMapOvr>
-  <p:transition spd="slow">
-    <p:cut/>
-  </p:transition>
   <p:timing>
     <p:tnLst>
       <p:par>
@@ -20726,9 +20660,6 @@
   <p:clrMapOvr>
     <a:masterClrMapping/>
   </p:clrMapOvr>
-  <p:transition spd="slow">
-    <p:cut/>
-  </p:transition>
   <p:timing>
     <p:tnLst>
       <p:par>
@@ -21155,9 +21086,6 @@
   <p:clrMapOvr>
     <a:masterClrMapping/>
   </p:clrMapOvr>
-  <p:transition spd="slow">
-    <p:cut/>
-  </p:transition>
   <p:timing>
     <p:tnLst>
       <p:par>
@@ -21342,9 +21270,6 @@
   <p:clrMapOvr>
     <a:masterClrMapping/>
   </p:clrMapOvr>
-  <p:transition spd="slow">
-    <p:cut/>
-  </p:transition>
 </p:sld>
 </file>
 
@@ -21456,18 +21381,6 @@
             </a:pPr>
             <a:r>
               <a:rPr lang="en" sz="1800"/>
-              <a:t>No learning rate required</a:t>
-            </a:r>
-          </a:p>
-          <a:p>
-            <a:pPr indent="-342900" lvl="0" marL="457200" rtl="0">
-              <a:spcBef>
-                <a:spcPts val="0"/>
-              </a:spcBef>
-              <a:buSzPct val="100000"/>
-            </a:pPr>
-            <a:r>
-              <a:rPr lang="en" sz="1800"/>
               <a:t>Available in Spark/MLlib</a:t>
             </a:r>
           </a:p>
@@ -21611,9 +21524,6 @@
   <p:clrMapOvr>
     <a:masterClrMapping/>
   </p:clrMapOvr>
-  <p:transition spd="slow">
-    <p:cut/>
-  </p:transition>
   <p:timing>
     <p:tnLst>
       <p:par>
@@ -21910,9 +21820,6 @@
   <p:clrMapOvr>
     <a:masterClrMapping/>
   </p:clrMapOvr>
-  <p:transition spd="slow">
-    <p:cut/>
-  </p:transition>
   <p:timing>
     <p:tnLst>
       <p:par>
@@ -22264,9 +22171,6 @@
   <p:clrMapOvr>
     <a:masterClrMapping/>
   </p:clrMapOvr>
-  <p:transition spd="slow">
-    <p:cut/>
-  </p:transition>
   <p:timing>
     <p:tnLst>
       <p:par>
@@ -22882,9 +22786,6 @@
   <p:clrMapOvr>
     <a:masterClrMapping/>
   </p:clrMapOvr>
-  <p:transition spd="slow">
-    <p:cut/>
-  </p:transition>
   <p:timing>
     <p:tnLst>
       <p:par>
@@ -23385,9 +23286,6 @@
   <p:clrMapOvr>
     <a:masterClrMapping/>
   </p:clrMapOvr>
-  <p:transition spd="slow">
-    <p:cut/>
-  </p:transition>
   <p:timing>
     <p:tnLst>
       <p:par>
@@ -24085,9 +23983,6 @@
   <p:clrMapOvr>
     <a:masterClrMapping/>
   </p:clrMapOvr>
-  <p:transition spd="slow">
-    <p:cut/>
-  </p:transition>
   <p:timing>
     <p:tnLst>
       <p:par>
@@ -24765,9 +24660,6 @@
   <p:clrMapOvr>
     <a:masterClrMapping/>
   </p:clrMapOvr>
-  <p:transition spd="slow">
-    <p:cut/>
-  </p:transition>
   <p:timing>
     <p:tnLst>
       <p:par>
@@ -25890,9 +25782,6 @@
   <p:clrMapOvr>
     <a:masterClrMapping/>
   </p:clrMapOvr>
-  <p:transition spd="slow">
-    <p:cut/>
-  </p:transition>
   <p:timing>
     <p:tnLst>
       <p:par>
@@ -26586,9 +26475,6 @@
   <p:clrMapOvr>
     <a:masterClrMapping/>
   </p:clrMapOvr>
-  <p:transition spd="slow">
-    <p:cut/>
-  </p:transition>
   <p:timing>
     <p:tnLst>
       <p:par>
@@ -27518,9 +27404,6 @@
   <p:clrMapOvr>
     <a:masterClrMapping/>
   </p:clrMapOvr>
-  <p:transition spd="slow">
-    <p:cut/>
-  </p:transition>
   <p:timing>
     <p:tnLst>
       <p:par>
@@ -28152,9 +28035,6 @@
   <p:clrMapOvr>
     <a:masterClrMapping/>
   </p:clrMapOvr>
-  <p:transition spd="slow">
-    <p:cut/>
-  </p:transition>
 </p:sld>
 </file>
 
@@ -28344,9 +28224,6 @@
   <p:clrMapOvr>
     <a:masterClrMapping/>
   </p:clrMapOvr>
-  <p:transition spd="slow">
-    <p:cut/>
-  </p:transition>
 </p:sld>
 </file>
 
@@ -28805,9 +28682,6 @@
   <p:clrMapOvr>
     <a:masterClrMapping/>
   </p:clrMapOvr>
-  <p:transition spd="slow">
-    <p:cut/>
-  </p:transition>
   <p:timing>
     <p:tnLst>
       <p:par>
@@ -30368,9 +30242,6 @@
   <p:clrMapOvr>
     <a:masterClrMapping/>
   </p:clrMapOvr>
-  <p:transition spd="slow">
-    <p:cut/>
-  </p:transition>
   <p:timing>
     <p:tnLst>
       <p:par>
@@ -30738,9 +30609,6 @@
   <p:clrMapOvr>
     <a:masterClrMapping/>
   </p:clrMapOvr>
-  <p:transition spd="slow">
-    <p:cut/>
-  </p:transition>
   <p:timing>
     <p:tnLst>
       <p:par>
@@ -31138,13 +31006,289 @@
   <p:clrMapOvr>
     <a:masterClrMapping/>
   </p:clrMapOvr>
-  <p:transition spd="slow">
-    <p:cut/>
-  </p:transition>
 </p:sld>
 </file>
 
 <file path=ppt/theme/theme1.xml><?xml version="1.0" encoding="utf-8"?>
+<a:theme xmlns:a="http://schemas.openxmlformats.org/drawingml/2006/main" xmlns:r="http://schemas.openxmlformats.org/officeDocument/2006/relationships" name="Custom Theme">
+  <a:themeElements>
+    <a:clrScheme name="Default">
+      <a:dk1>
+        <a:srgbClr val="000000"/>
+      </a:dk1>
+      <a:lt1>
+        <a:srgbClr val="FFFFFF"/>
+      </a:lt1>
+      <a:dk2>
+        <a:srgbClr val="158158"/>
+      </a:dk2>
+      <a:lt2>
+        <a:srgbClr val="F3F3F3"/>
+      </a:lt2>
+      <a:accent1>
+        <a:srgbClr val="058DC7"/>
+      </a:accent1>
+      <a:accent2>
+        <a:srgbClr val="50B432"/>
+      </a:accent2>
+      <a:accent3>
+        <a:srgbClr val="ED561B"/>
+      </a:accent3>
+      <a:accent4>
+        <a:srgbClr val="EDEF00"/>
+      </a:accent4>
+      <a:accent5>
+        <a:srgbClr val="24CBE5"/>
+      </a:accent5>
+      <a:accent6>
+        <a:srgbClr val="64E572"/>
+      </a:accent6>
+      <a:hlink>
+        <a:srgbClr val="2200CC"/>
+      </a:hlink>
+      <a:folHlink>
+        <a:srgbClr val="551A8B"/>
+      </a:folHlink>
+    </a:clrScheme>
+    <a:fontScheme name="Office">
+      <a:majorFont>
+        <a:latin typeface="Arial"/>
+        <a:ea typeface=""/>
+        <a:cs typeface=""/>
+        <a:font script="Jpan" typeface="ＭＳ Ｐゴシック"/>
+        <a:font script="Hang" typeface="맑은 고딕"/>
+        <a:font script="Hans" typeface="宋体"/>
+        <a:font script="Hant" typeface="新細明體"/>
+        <a:font script="Arab" typeface="Times New Roman"/>
+        <a:font script="Hebr" typeface="Times New Roman"/>
+        <a:font script="Thai" typeface="Angsana New"/>
+        <a:font script="Ethi" typeface="Nyala"/>
+        <a:font script="Beng" typeface="Vrinda"/>
+        <a:font script="Gujr" typeface="Shruti"/>
+        <a:font script="Khmr" typeface="MoolBoran"/>
+        <a:font script="Knda" typeface="Tunga"/>
+        <a:font script="Guru" typeface="Raavi"/>
+        <a:font script="Cans" typeface="Euphemia"/>
+        <a:font script="Cher" typeface="Plantagenet Cherokee"/>
+        <a:font script="Yiii" typeface="Microsoft Yi Baiti"/>
+        <a:font script="Tibt" typeface="Microsoft Himalaya"/>
+        <a:font script="Thaa" typeface="MV Boli"/>
+        <a:font script="Deva" typeface="Mangal"/>
+        <a:font script="Telu" typeface="Gautami"/>
+        <a:font script="Taml" typeface="Latha"/>
+        <a:font script="Syrc" typeface="Estrangelo Edessa"/>
+        <a:font script="Orya" typeface="Kalinga"/>
+        <a:font script="Mlym" typeface="Kartika"/>
+        <a:font script="Laoo" typeface="DokChampa"/>
+        <a:font script="Sinh" typeface="Iskoola Pota"/>
+        <a:font script="Mong" typeface="Mongolian Baiti"/>
+        <a:font script="Viet" typeface="Times New Roman"/>
+        <a:font script="Uigh" typeface="Microsoft Uighur"/>
+        <a:font script="Geor" typeface="Sylfaen"/>
+      </a:majorFont>
+      <a:minorFont>
+        <a:latin typeface="Arial"/>
+        <a:ea typeface=""/>
+        <a:cs typeface=""/>
+        <a:font script="Jpan" typeface="ＭＳ Ｐゴシック"/>
+        <a:font script="Hang" typeface="맑은 고딕"/>
+        <a:font script="Hans" typeface="宋体"/>
+        <a:font script="Hant" typeface="新細明體"/>
+        <a:font script="Arab" typeface="Arial"/>
+        <a:font script="Hebr" typeface="Arial"/>
+        <a:font script="Thai" typeface="Cordia New"/>
+        <a:font script="Ethi" typeface="Nyala"/>
+        <a:font script="Beng" typeface="Vrinda"/>
+        <a:font script="Gujr" typeface="Shruti"/>
+        <a:font script="Khmr" typeface="DaunPenh"/>
+        <a:font script="Knda" typeface="Tunga"/>
+        <a:font script="Guru" typeface="Raavi"/>
+        <a:font script="Cans" typeface="Euphemia"/>
+        <a:font script="Cher" typeface="Plantagenet Cherokee"/>
+        <a:font script="Yiii" typeface="Microsoft Yi Baiti"/>
+        <a:font script="Tibt" typeface="Microsoft Himalaya"/>
+        <a:font script="Thaa" typeface="MV Boli"/>
+        <a:font script="Deva" typeface="Mangal"/>
+        <a:font script="Telu" typeface="Gautami"/>
+        <a:font script="Taml" typeface="Latha"/>
+        <a:font script="Syrc" typeface="Estrangelo Edessa"/>
+        <a:font script="Orya" typeface="Kalinga"/>
+        <a:font script="Mlym" typeface="Kartika"/>
+        <a:font script="Laoo" typeface="DokChampa"/>
+        <a:font script="Sinh" typeface="Iskoola Pota"/>
+        <a:font script="Mong" typeface="Mongolian Baiti"/>
+        <a:font script="Viet" typeface="Arial"/>
+        <a:font script="Uigh" typeface="Microsoft Uighur"/>
+        <a:font script="Geor" typeface="Sylfaen"/>
+      </a:minorFont>
+    </a:fontScheme>
+    <a:fmtScheme name="Office">
+      <a:fillStyleLst>
+        <a:solidFill>
+          <a:schemeClr val="phClr"/>
+        </a:solidFill>
+        <a:gradFill rotWithShape="1">
+          <a:gsLst>
+            <a:gs pos="0">
+              <a:schemeClr val="phClr">
+                <a:tint val="50000"/>
+                <a:satMod val="300000"/>
+              </a:schemeClr>
+            </a:gs>
+            <a:gs pos="35000">
+              <a:schemeClr val="phClr">
+                <a:tint val="37000"/>
+                <a:satMod val="300000"/>
+              </a:schemeClr>
+            </a:gs>
+            <a:gs pos="100000">
+              <a:schemeClr val="phClr">
+                <a:tint val="15000"/>
+                <a:satMod val="350000"/>
+              </a:schemeClr>
+            </a:gs>
+          </a:gsLst>
+          <a:lin ang="16200000" scaled="1"/>
+        </a:gradFill>
+        <a:gradFill rotWithShape="1">
+          <a:gsLst>
+            <a:gs pos="0">
+              <a:schemeClr val="phClr">
+                <a:tint val="100000"/>
+                <a:shade val="100000"/>
+                <a:satMod val="130000"/>
+              </a:schemeClr>
+            </a:gs>
+            <a:gs pos="100000">
+              <a:schemeClr val="phClr">
+                <a:tint val="50000"/>
+                <a:shade val="100000"/>
+                <a:satMod val="350000"/>
+              </a:schemeClr>
+            </a:gs>
+          </a:gsLst>
+          <a:lin ang="16200000" scaled="0"/>
+        </a:gradFill>
+      </a:fillStyleLst>
+      <a:lnStyleLst>
+        <a:ln w="9525" cap="flat" cmpd="sng" algn="ctr">
+          <a:solidFill>
+            <a:schemeClr val="phClr">
+              <a:shade val="95000"/>
+              <a:satMod val="105000"/>
+            </a:schemeClr>
+          </a:solidFill>
+          <a:prstDash val="solid"/>
+        </a:ln>
+        <a:ln w="25400" cap="flat" cmpd="sng" algn="ctr">
+          <a:solidFill>
+            <a:schemeClr val="phClr"/>
+          </a:solidFill>
+          <a:prstDash val="solid"/>
+        </a:ln>
+        <a:ln w="38100" cap="flat" cmpd="sng" algn="ctr">
+          <a:solidFill>
+            <a:schemeClr val="phClr"/>
+          </a:solidFill>
+          <a:prstDash val="solid"/>
+        </a:ln>
+      </a:lnStyleLst>
+      <a:effectStyleLst>
+        <a:effectStyle>
+          <a:effectLst>
+            <a:outerShdw blurRad="40000" dist="20000" dir="5400000" rotWithShape="0">
+              <a:srgbClr val="000000">
+                <a:alpha val="38000"/>
+              </a:srgbClr>
+            </a:outerShdw>
+          </a:effectLst>
+        </a:effectStyle>
+        <a:effectStyle>
+          <a:effectLst>
+            <a:outerShdw blurRad="40000" dist="23000" dir="5400000" rotWithShape="0">
+              <a:srgbClr val="000000">
+                <a:alpha val="35000"/>
+              </a:srgbClr>
+            </a:outerShdw>
+          </a:effectLst>
+        </a:effectStyle>
+        <a:effectStyle>
+          <a:effectLst>
+            <a:outerShdw blurRad="40000" dist="23000" dir="5400000" rotWithShape="0">
+              <a:srgbClr val="000000">
+                <a:alpha val="35000"/>
+              </a:srgbClr>
+            </a:outerShdw>
+          </a:effectLst>
+          <a:scene3d>
+            <a:camera prst="orthographicFront">
+              <a:rot lat="0" lon="0" rev="0"/>
+            </a:camera>
+            <a:lightRig rig="threePt" dir="t">
+              <a:rot lat="0" lon="0" rev="1200000"/>
+            </a:lightRig>
+          </a:scene3d>
+          <a:sp3d>
+            <a:bevelT w="63500" h="25400"/>
+          </a:sp3d>
+        </a:effectStyle>
+      </a:effectStyleLst>
+      <a:bgFillStyleLst>
+        <a:solidFill>
+          <a:schemeClr val="phClr"/>
+        </a:solidFill>
+        <a:gradFill rotWithShape="1">
+          <a:gsLst>
+            <a:gs pos="0">
+              <a:schemeClr val="phClr">
+                <a:tint val="40000"/>
+                <a:satMod val="350000"/>
+              </a:schemeClr>
+            </a:gs>
+            <a:gs pos="40000">
+              <a:schemeClr val="phClr">
+                <a:tint val="45000"/>
+                <a:shade val="99000"/>
+                <a:satMod val="350000"/>
+              </a:schemeClr>
+            </a:gs>
+            <a:gs pos="100000">
+              <a:schemeClr val="phClr">
+                <a:shade val="20000"/>
+                <a:satMod val="255000"/>
+              </a:schemeClr>
+            </a:gs>
+          </a:gsLst>
+          <a:path path="circle">
+            <a:fillToRect l="50000" t="-80000" r="50000" b="180000"/>
+          </a:path>
+        </a:gradFill>
+        <a:gradFill rotWithShape="1">
+          <a:gsLst>
+            <a:gs pos="0">
+              <a:schemeClr val="phClr">
+                <a:tint val="80000"/>
+                <a:satMod val="300000"/>
+              </a:schemeClr>
+            </a:gs>
+            <a:gs pos="100000">
+              <a:schemeClr val="phClr">
+                <a:shade val="30000"/>
+                <a:satMod val="200000"/>
+              </a:schemeClr>
+            </a:gs>
+          </a:gsLst>
+          <a:path path="circle">
+            <a:fillToRect l="50000" t="50000" r="50000" b="50000"/>
+          </a:path>
+        </a:gradFill>
+      </a:bgFillStyleLst>
+    </a:fmtScheme>
+  </a:themeElements>
+</a:theme>
+</file>
+
+<file path=ppt/theme/theme2.xml><?xml version="1.0" encoding="utf-8"?>
 <a:theme xmlns:a="http://schemas.openxmlformats.org/drawingml/2006/main" xmlns:r="http://schemas.openxmlformats.org/officeDocument/2006/relationships" name="material">
   <a:themeElements>
     <a:clrScheme name="Material">
@@ -31421,283 +31565,4 @@
     </a:fmtScheme>
   </a:themeElements>
 </a:theme>
-</file>
-
-<file path=ppt/theme/theme2.xml><?xml version="1.0" encoding="utf-8"?>
-<a:theme xmlns:a="http://schemas.openxmlformats.org/drawingml/2006/main" xmlns:r="http://schemas.openxmlformats.org/officeDocument/2006/relationships" name="Custom Theme">
-  <a:themeElements>
-    <a:clrScheme name="Default">
-      <a:dk1>
-        <a:srgbClr val="000000"/>
-      </a:dk1>
-      <a:lt1>
-        <a:srgbClr val="FFFFFF"/>
-      </a:lt1>
-      <a:dk2>
-        <a:srgbClr val="158158"/>
-      </a:dk2>
-      <a:lt2>
-        <a:srgbClr val="F3F3F3"/>
-      </a:lt2>
-      <a:accent1>
-        <a:srgbClr val="058DC7"/>
-      </a:accent1>
-      <a:accent2>
-        <a:srgbClr val="50B432"/>
-      </a:accent2>
-      <a:accent3>
-        <a:srgbClr val="ED561B"/>
-      </a:accent3>
-      <a:accent4>
-        <a:srgbClr val="EDEF00"/>
-      </a:accent4>
-      <a:accent5>
-        <a:srgbClr val="24CBE5"/>
-      </a:accent5>
-      <a:accent6>
-        <a:srgbClr val="64E572"/>
-      </a:accent6>
-      <a:hlink>
-        <a:srgbClr val="2200CC"/>
-      </a:hlink>
-      <a:folHlink>
-        <a:srgbClr val="551A8B"/>
-      </a:folHlink>
-    </a:clrScheme>
-    <a:fontScheme name="Office">
-      <a:majorFont>
-        <a:latin typeface="Arial"/>
-        <a:ea typeface=""/>
-        <a:cs typeface=""/>
-        <a:font script="Jpan" typeface="ＭＳ Ｐゴシック"/>
-        <a:font script="Hang" typeface="맑은 고딕"/>
-        <a:font script="Hans" typeface="宋体"/>
-        <a:font script="Hant" typeface="新細明體"/>
-        <a:font script="Arab" typeface="Times New Roman"/>
-        <a:font script="Hebr" typeface="Times New Roman"/>
-        <a:font script="Thai" typeface="Angsana New"/>
-        <a:font script="Ethi" typeface="Nyala"/>
-        <a:font script="Beng" typeface="Vrinda"/>
-        <a:font script="Gujr" typeface="Shruti"/>
-        <a:font script="Khmr" typeface="MoolBoran"/>
-        <a:font script="Knda" typeface="Tunga"/>
-        <a:font script="Guru" typeface="Raavi"/>
-        <a:font script="Cans" typeface="Euphemia"/>
-        <a:font script="Cher" typeface="Plantagenet Cherokee"/>
-        <a:font script="Yiii" typeface="Microsoft Yi Baiti"/>
-        <a:font script="Tibt" typeface="Microsoft Himalaya"/>
-        <a:font script="Thaa" typeface="MV Boli"/>
-        <a:font script="Deva" typeface="Mangal"/>
-        <a:font script="Telu" typeface="Gautami"/>
-        <a:font script="Taml" typeface="Latha"/>
-        <a:font script="Syrc" typeface="Estrangelo Edessa"/>
-        <a:font script="Orya" typeface="Kalinga"/>
-        <a:font script="Mlym" typeface="Kartika"/>
-        <a:font script="Laoo" typeface="DokChampa"/>
-        <a:font script="Sinh" typeface="Iskoola Pota"/>
-        <a:font script="Mong" typeface="Mongolian Baiti"/>
-        <a:font script="Viet" typeface="Times New Roman"/>
-        <a:font script="Uigh" typeface="Microsoft Uighur"/>
-        <a:font script="Geor" typeface="Sylfaen"/>
-      </a:majorFont>
-      <a:minorFont>
-        <a:latin typeface="Arial"/>
-        <a:ea typeface=""/>
-        <a:cs typeface=""/>
-        <a:font script="Jpan" typeface="ＭＳ Ｐゴシック"/>
-        <a:font script="Hang" typeface="맑은 고딕"/>
-        <a:font script="Hans" typeface="宋体"/>
-        <a:font script="Hant" typeface="新細明體"/>
-        <a:font script="Arab" typeface="Arial"/>
-        <a:font script="Hebr" typeface="Arial"/>
-        <a:font script="Thai" typeface="Cordia New"/>
-        <a:font script="Ethi" typeface="Nyala"/>
-        <a:font script="Beng" typeface="Vrinda"/>
-        <a:font script="Gujr" typeface="Shruti"/>
-        <a:font script="Khmr" typeface="DaunPenh"/>
-        <a:font script="Knda" typeface="Tunga"/>
-        <a:font script="Guru" typeface="Raavi"/>
-        <a:font script="Cans" typeface="Euphemia"/>
-        <a:font script="Cher" typeface="Plantagenet Cherokee"/>
-        <a:font script="Yiii" typeface="Microsoft Yi Baiti"/>
-        <a:font script="Tibt" typeface="Microsoft Himalaya"/>
-        <a:font script="Thaa" typeface="MV Boli"/>
-        <a:font script="Deva" typeface="Mangal"/>
-        <a:font script="Telu" typeface="Gautami"/>
-        <a:font script="Taml" typeface="Latha"/>
-        <a:font script="Syrc" typeface="Estrangelo Edessa"/>
-        <a:font script="Orya" typeface="Kalinga"/>
-        <a:font script="Mlym" typeface="Kartika"/>
-        <a:font script="Laoo" typeface="DokChampa"/>
-        <a:font script="Sinh" typeface="Iskoola Pota"/>
-        <a:font script="Mong" typeface="Mongolian Baiti"/>
-        <a:font script="Viet" typeface="Arial"/>
-        <a:font script="Uigh" typeface="Microsoft Uighur"/>
-        <a:font script="Geor" typeface="Sylfaen"/>
-      </a:minorFont>
-    </a:fontScheme>
-    <a:fmtScheme name="Office">
-      <a:fillStyleLst>
-        <a:solidFill>
-          <a:schemeClr val="phClr"/>
-        </a:solidFill>
-        <a:gradFill rotWithShape="1">
-          <a:gsLst>
-            <a:gs pos="0">
-              <a:schemeClr val="phClr">
-                <a:tint val="50000"/>
-                <a:satMod val="300000"/>
-              </a:schemeClr>
-            </a:gs>
-            <a:gs pos="35000">
-              <a:schemeClr val="phClr">
-                <a:tint val="37000"/>
-                <a:satMod val="300000"/>
-              </a:schemeClr>
-            </a:gs>
-            <a:gs pos="100000">
-              <a:schemeClr val="phClr">
-                <a:tint val="15000"/>
-                <a:satMod val="350000"/>
-              </a:schemeClr>
-            </a:gs>
-          </a:gsLst>
-          <a:lin ang="16200000" scaled="1"/>
-        </a:gradFill>
-        <a:gradFill rotWithShape="1">
-          <a:gsLst>
-            <a:gs pos="0">
-              <a:schemeClr val="phClr">
-                <a:tint val="100000"/>
-                <a:shade val="100000"/>
-                <a:satMod val="130000"/>
-              </a:schemeClr>
-            </a:gs>
-            <a:gs pos="100000">
-              <a:schemeClr val="phClr">
-                <a:tint val="50000"/>
-                <a:shade val="100000"/>
-                <a:satMod val="350000"/>
-              </a:schemeClr>
-            </a:gs>
-          </a:gsLst>
-          <a:lin ang="16200000" scaled="0"/>
-        </a:gradFill>
-      </a:fillStyleLst>
-      <a:lnStyleLst>
-        <a:ln w="9525" cap="flat" cmpd="sng" algn="ctr">
-          <a:solidFill>
-            <a:schemeClr val="phClr">
-              <a:shade val="95000"/>
-              <a:satMod val="105000"/>
-            </a:schemeClr>
-          </a:solidFill>
-          <a:prstDash val="solid"/>
-        </a:ln>
-        <a:ln w="25400" cap="flat" cmpd="sng" algn="ctr">
-          <a:solidFill>
-            <a:schemeClr val="phClr"/>
-          </a:solidFill>
-          <a:prstDash val="solid"/>
-        </a:ln>
-        <a:ln w="38100" cap="flat" cmpd="sng" algn="ctr">
-          <a:solidFill>
-            <a:schemeClr val="phClr"/>
-          </a:solidFill>
-          <a:prstDash val="solid"/>
-        </a:ln>
-      </a:lnStyleLst>
-      <a:effectStyleLst>
-        <a:effectStyle>
-          <a:effectLst>
-            <a:outerShdw blurRad="40000" dist="20000" dir="5400000" rotWithShape="0">
-              <a:srgbClr val="000000">
-                <a:alpha val="38000"/>
-              </a:srgbClr>
-            </a:outerShdw>
-          </a:effectLst>
-        </a:effectStyle>
-        <a:effectStyle>
-          <a:effectLst>
-            <a:outerShdw blurRad="40000" dist="23000" dir="5400000" rotWithShape="0">
-              <a:srgbClr val="000000">
-                <a:alpha val="35000"/>
-              </a:srgbClr>
-            </a:outerShdw>
-          </a:effectLst>
-        </a:effectStyle>
-        <a:effectStyle>
-          <a:effectLst>
-            <a:outerShdw blurRad="40000" dist="23000" dir="5400000" rotWithShape="0">
-              <a:srgbClr val="000000">
-                <a:alpha val="35000"/>
-              </a:srgbClr>
-            </a:outerShdw>
-          </a:effectLst>
-          <a:scene3d>
-            <a:camera prst="orthographicFront">
-              <a:rot lat="0" lon="0" rev="0"/>
-            </a:camera>
-            <a:lightRig rig="threePt" dir="t">
-              <a:rot lat="0" lon="0" rev="1200000"/>
-            </a:lightRig>
-          </a:scene3d>
-          <a:sp3d>
-            <a:bevelT w="63500" h="25400"/>
-          </a:sp3d>
-        </a:effectStyle>
-      </a:effectStyleLst>
-      <a:bgFillStyleLst>
-        <a:solidFill>
-          <a:schemeClr val="phClr"/>
-        </a:solidFill>
-        <a:gradFill rotWithShape="1">
-          <a:gsLst>
-            <a:gs pos="0">
-              <a:schemeClr val="phClr">
-                <a:tint val="40000"/>
-                <a:satMod val="350000"/>
-              </a:schemeClr>
-            </a:gs>
-            <a:gs pos="40000">
-              <a:schemeClr val="phClr">
-                <a:tint val="45000"/>
-                <a:shade val="99000"/>
-                <a:satMod val="350000"/>
-              </a:schemeClr>
-            </a:gs>
-            <a:gs pos="100000">
-              <a:schemeClr val="phClr">
-                <a:shade val="20000"/>
-                <a:satMod val="255000"/>
-              </a:schemeClr>
-            </a:gs>
-          </a:gsLst>
-          <a:path path="circle">
-            <a:fillToRect l="50000" t="-80000" r="50000" b="180000"/>
-          </a:path>
-        </a:gradFill>
-        <a:gradFill rotWithShape="1">
-          <a:gsLst>
-            <a:gs pos="0">
-              <a:schemeClr val="phClr">
-                <a:tint val="80000"/>
-                <a:satMod val="300000"/>
-              </a:schemeClr>
-            </a:gs>
-            <a:gs pos="100000">
-              <a:schemeClr val="phClr">
-                <a:shade val="30000"/>
-                <a:satMod val="200000"/>
-              </a:schemeClr>
-            </a:gs>
-          </a:gsLst>
-          <a:path path="circle">
-            <a:fillToRect l="50000" t="50000" r="50000" b="50000"/>
-          </a:path>
-        </a:gradFill>
-      </a:bgFillStyleLst>
-    </a:fmtScheme>
-  </a:themeElements>
-</a:theme>
 </file>
</xml_diff>